<commit_message>
Module 7 Lesson 3: Added some missing detail about Chef attributes and nodes
</commit_message>
<xml_diff>
--- a/Complimentary Course Content/Module7/Lessons/Module7_Lesson3 Introduction to Chef.pptx
+++ b/Complimentary Course Content/Module7/Lessons/Module7_Lesson3 Introduction to Chef.pptx
@@ -145,7 +145,7 @@
   </p:defaultTextStyle>
   <p:extLst>
     <p:ext uri="{EFAFB233-063F-42B5-8137-9DF3F51BA10A}">
-      <p15:sldGuideLst xmlns="" xmlns:p15="http://schemas.microsoft.com/office/powerpoint/2012/main">
+      <p15:sldGuideLst xmlns:p15="http://schemas.microsoft.com/office/powerpoint/2012/main">
         <p15:guide id="1" orient="horz" pos="2184" userDrawn="1">
           <p15:clr>
             <a:srgbClr val="A4A3A4"/>
@@ -266,7 +266,7 @@
             <a:fld id="{49B60EF2-7028-489F-85D8-FE86CD7CF2A0}" type="datetimeFigureOut">
               <a:rPr lang="en-US" smtClean="0"/>
               <a:pPr/>
-              <a:t>7/29/16</a:t>
+              <a:t>3/7/17</a:t>
             </a:fld>
             <a:endParaRPr lang="en-US"/>
           </a:p>
@@ -3275,37 +3275,8 @@
                   <a:schemeClr val="tx1"/>
                 </a:solidFill>
               </a:rPr>
-              <a:t>“Resource </a:t>
-            </a:r>
-            <a:r>
-              <a:rPr lang="en-US" sz="1200" dirty="0" smtClean="0">
-                <a:solidFill>
-                  <a:schemeClr val="tx1"/>
-                </a:solidFill>
-              </a:rPr>
-              <a:t>is a </a:t>
-            </a:r>
-            <a:r>
-              <a:rPr lang="en-US" sz="1200" dirty="0" smtClean="0">
-                <a:solidFill>
-                  <a:schemeClr val="tx1"/>
-                </a:solidFill>
-              </a:rPr>
-              <a:t>statement </a:t>
-            </a:r>
-            <a:r>
-              <a:rPr lang="en-US" sz="1200" dirty="0" smtClean="0">
-                <a:solidFill>
-                  <a:schemeClr val="tx1"/>
-                </a:solidFill>
-              </a:rPr>
-              <a:t>of configuration policy”. </a:t>
-            </a:r>
-            <a:endParaRPr lang="en-US" sz="1200" dirty="0" smtClean="0">
-              <a:solidFill>
-                <a:schemeClr val="tx1"/>
-              </a:solidFill>
-            </a:endParaRPr>
+              <a:t>“Resource is a statement of configuration policy”. </a:t>
+            </a:r>
           </a:p>
           <a:p>
             <a:pPr marL="171450" marR="0" lvl="0" indent="-171450" algn="l" defTabSz="914400" rtl="0" eaLnBrk="1" fontAlgn="auto" latinLnBrk="0" hangingPunct="1">
@@ -3331,21 +3302,8 @@
                   <a:schemeClr val="tx1"/>
                 </a:solidFill>
               </a:rPr>
-              <a:t>It </a:t>
-            </a:r>
-            <a:r>
-              <a:rPr lang="en-US" sz="1200" dirty="0" smtClean="0">
-                <a:solidFill>
-                  <a:schemeClr val="tx1"/>
-                </a:solidFill>
-              </a:rPr>
-              <a:t>specifies the desired state of a system component or configuration item. </a:t>
-            </a:r>
-            <a:endParaRPr lang="en-US" sz="1200" dirty="0" smtClean="0">
-              <a:solidFill>
-                <a:schemeClr val="tx1"/>
-              </a:solidFill>
-            </a:endParaRPr>
+              <a:t>It specifies the desired state of a system component or configuration item. </a:t>
+            </a:r>
           </a:p>
           <a:p>
             <a:pPr marL="171450" marR="0" lvl="0" indent="-171450" algn="l" defTabSz="914400" rtl="0" eaLnBrk="1" fontAlgn="auto" latinLnBrk="0" hangingPunct="1">
@@ -3371,31 +3329,15 @@
                   <a:schemeClr val="tx1"/>
                 </a:solidFill>
               </a:rPr>
-              <a:t>building </a:t>
-            </a:r>
-            <a:r>
-              <a:rPr lang="en-US" sz="1200" dirty="0" smtClean="0">
+              <a:t>building blocks of</a:t>
+            </a:r>
+            <a:r>
+              <a:rPr lang="en-US" sz="1200" baseline="0" dirty="0" smtClean="0">
                 <a:solidFill>
                   <a:schemeClr val="tx1"/>
                 </a:solidFill>
               </a:rPr>
-              <a:t>blocks of</a:t>
-            </a:r>
-            <a:r>
-              <a:rPr lang="en-US" sz="1200" baseline="0" dirty="0" smtClean="0">
-                <a:solidFill>
-                  <a:schemeClr val="tx1"/>
-                </a:solidFill>
-              </a:rPr>
-              <a:t> </a:t>
-            </a:r>
-            <a:r>
-              <a:rPr lang="en-US" sz="1200" baseline="0" dirty="0" smtClean="0">
-                <a:solidFill>
-                  <a:schemeClr val="tx1"/>
-                </a:solidFill>
-              </a:rPr>
-              <a:t>chef</a:t>
+              <a:t> chef</a:t>
             </a:r>
             <a:endParaRPr lang="en-US" sz="1200" dirty="0" smtClean="0">
               <a:solidFill>
@@ -3685,19 +3627,7 @@
             </a:pPr>
             <a:r>
               <a:rPr lang="en-US" b="0" baseline="0" dirty="0" smtClean="0"/>
-              <a:t>Every resource has a type that describes the most basic elements of the </a:t>
-            </a:r>
-            <a:r>
-              <a:rPr lang="en-US" b="0" baseline="0" dirty="0" smtClean="0"/>
-              <a:t>system, including: package, file, template</a:t>
-            </a:r>
-            <a:r>
-              <a:rPr lang="en-US" b="0" baseline="0" dirty="0" smtClean="0"/>
-              <a:t>, </a:t>
-            </a:r>
-            <a:r>
-              <a:rPr lang="en-US" b="0" baseline="0" dirty="0" smtClean="0"/>
-              <a:t>execute, service</a:t>
+              <a:t>Every resource has a type that describes the most basic elements of the system, including: package, file, template, execute, service</a:t>
             </a:r>
             <a:r>
               <a:rPr lang="is-IS" b="0" baseline="0" dirty="0" smtClean="0"/>
@@ -4091,17 +4021,8 @@
             </a:r>
             <a:r>
               <a:rPr lang="en-US" b="0" dirty="0" smtClean="0"/>
-              <a:t>of </a:t>
-            </a:r>
-            <a:r>
-              <a:rPr lang="en-US" b="0" dirty="0" smtClean="0"/>
-              <a:t>a </a:t>
-            </a:r>
-            <a:r>
-              <a:rPr lang="en-US" b="0" dirty="0" smtClean="0"/>
-              <a:t>block of ruby code</a:t>
-            </a:r>
-            <a:endParaRPr lang="en-US" b="0" dirty="0" smtClean="0"/>
+              <a:t>of a block of ruby code</a:t>
+            </a:r>
           </a:p>
           <a:p>
             <a:pPr marL="628650" marR="0" lvl="1" indent="-171450" algn="l" defTabSz="914400" rtl="0" eaLnBrk="1" fontAlgn="auto" latinLnBrk="0" hangingPunct="1">
@@ -4123,11 +4044,7 @@
             </a:pPr>
             <a:r>
               <a:rPr lang="en-US" b="0" dirty="0" smtClean="0"/>
-              <a:t>The ruby content is </a:t>
-            </a:r>
-            <a:r>
-              <a:rPr lang="en-US" b="0" dirty="0" smtClean="0"/>
-              <a:t>the second attribute(s) of</a:t>
+              <a:t>The ruby content is the second attribute(s) of</a:t>
             </a:r>
             <a:r>
               <a:rPr lang="en-US" b="0" baseline="0" dirty="0" smtClean="0"/>
@@ -4179,13 +4096,8 @@
             </a:r>
             <a:r>
               <a:rPr lang="en-US" b="0" dirty="0" smtClean="0"/>
-              <a:t>the </a:t>
-            </a:r>
-            <a:r>
-              <a:rPr lang="en-US" b="0" dirty="0" smtClean="0"/>
-              <a:t>content attribute </a:t>
-            </a:r>
-            <a:endParaRPr lang="en-US" b="0" dirty="0" smtClean="0"/>
+              <a:t>the content attribute </a:t>
+            </a:r>
           </a:p>
           <a:p>
             <a:pPr marL="628650" marR="0" lvl="1" indent="-171450" algn="l" defTabSz="914400" rtl="0" eaLnBrk="1" fontAlgn="auto" latinLnBrk="0" hangingPunct="1">
@@ -4230,19 +4142,7 @@
             </a:pPr>
             <a:r>
               <a:rPr lang="en-US" b="0" dirty="0" smtClean="0"/>
-              <a:t>the </a:t>
-            </a:r>
-            <a:r>
-              <a:rPr lang="en-US" b="0" dirty="0" smtClean="0"/>
-              <a:t>action method only takes one parameter</a:t>
-            </a:r>
-            <a:r>
-              <a:rPr lang="en-US" b="0" dirty="0" smtClean="0"/>
-              <a:t>, more </a:t>
-            </a:r>
-            <a:r>
-              <a:rPr lang="en-US" b="0" dirty="0" smtClean="0"/>
-              <a:t>than</a:t>
+              <a:t>the action method only takes one parameter, more than</a:t>
             </a:r>
             <a:r>
               <a:rPr lang="en-US" b="0" baseline="0" dirty="0" smtClean="0"/>
@@ -4250,15 +4150,7 @@
             </a:r>
             <a:r>
               <a:rPr lang="en-US" b="0" dirty="0" smtClean="0"/>
-              <a:t>actions </a:t>
-            </a:r>
-            <a:r>
-              <a:rPr lang="en-US" b="0" dirty="0" smtClean="0"/>
-              <a:t>need an </a:t>
-            </a:r>
-            <a:r>
-              <a:rPr lang="en-US" b="0" dirty="0" smtClean="0"/>
-              <a:t>Array</a:t>
+              <a:t>actions need an Array</a:t>
             </a:r>
           </a:p>
           <a:p>
@@ -4328,11 +4220,7 @@
             </a:pPr>
             <a:r>
               <a:rPr lang="en-US" b="0" dirty="0" smtClean="0"/>
-              <a:t>Resources can have ‘default’ actions (not all do</a:t>
-            </a:r>
-            <a:r>
-              <a:rPr lang="en-US" b="0" dirty="0" smtClean="0"/>
-              <a:t>)</a:t>
+              <a:t>Resources can have ‘default’ actions (not all do)</a:t>
             </a:r>
           </a:p>
           <a:p>
@@ -4355,15 +4243,7 @@
             </a:pPr>
             <a:r>
               <a:rPr lang="en-US" b="0" dirty="0" smtClean="0"/>
-              <a:t>:</a:t>
-            </a:r>
-            <a:r>
-              <a:rPr lang="en-US" b="0" dirty="0" smtClean="0"/>
-              <a:t>install </a:t>
-            </a:r>
-            <a:r>
-              <a:rPr lang="en-US" b="0" dirty="0" smtClean="0"/>
-              <a:t>is</a:t>
+              <a:t>:install is</a:t>
             </a:r>
             <a:r>
               <a:rPr lang="en-US" b="0" baseline="0" dirty="0" smtClean="0"/>
@@ -4959,11 +4839,7 @@
             </a:pPr>
             <a:r>
               <a:rPr lang="en-US" sz="1200" b="0" dirty="0" smtClean="0"/>
-              <a:t>Recipes are </a:t>
-            </a:r>
-            <a:r>
-              <a:rPr lang="en-US" sz="1200" b="0" dirty="0" smtClean="0"/>
-              <a:t>Ruby files</a:t>
+              <a:t>Recipes are Ruby files</a:t>
             </a:r>
           </a:p>
           <a:p>
@@ -5018,11 +4894,7 @@
             </a:r>
             <a:r>
               <a:rPr lang="en-US" sz="1200" b="0" baseline="0" dirty="0" smtClean="0"/>
-              <a:t> </a:t>
-            </a:r>
-            <a:r>
-              <a:rPr lang="en-US" sz="1200" b="0" baseline="0" dirty="0" smtClean="0"/>
-              <a:t>cookbooks</a:t>
+              <a:t> cookbooks</a:t>
             </a:r>
           </a:p>
           <a:p>
@@ -6728,11 +6600,7 @@
             </a:r>
             <a:r>
               <a:rPr lang="en-US" b="0" smtClean="0"/>
-              <a:t>list </a:t>
-            </a:r>
-            <a:r>
-              <a:rPr lang="en-US" b="0" smtClean="0"/>
-              <a:t>is made </a:t>
+              <a:t>list is made </a:t>
             </a:r>
             <a:r>
               <a:rPr lang="en-US" b="0" dirty="0" smtClean="0"/>
@@ -6744,11 +6612,7 @@
             </a:r>
             <a:r>
               <a:rPr lang="en-US" b="0" dirty="0" smtClean="0"/>
-              <a:t>an exact order. </a:t>
-            </a:r>
-            <a:r>
-              <a:rPr lang="en-US" b="0" dirty="0" smtClean="0"/>
-              <a:t>The node object consists of the run-list and node attributes, which is a JSON file that is stored on the Chef server. The chef-client gets a copy of the node object from the Chef server during each chef-client run and places an updated copy on the Chef server at the end of each chef-client run.</a:t>
+              <a:t>an exact order. The node object consists of the run-list and node attributes, which is a JSON file that is stored on the Chef server. The chef-client gets a copy of the node object from the Chef server during each chef-client run and places an updated copy on the Chef server at the end of each chef-client run.</a:t>
             </a:r>
           </a:p>
           <a:p>
@@ -9595,7 +9459,7 @@
             <a:fld id="{0459C166-16D3-4A25-A2F8-C51E0E346B22}" type="datetimeFigureOut">
               <a:rPr lang="en-US" smtClean="0"/>
               <a:pPr/>
-              <a:t>7/29/16</a:t>
+              <a:t>3/7/17</a:t>
             </a:fld>
             <a:endParaRPr lang="en-US"/>
           </a:p>
@@ -9964,7 +9828,7 @@
             <a:fld id="{0459C166-16D3-4A25-A2F8-C51E0E346B22}" type="datetimeFigureOut">
               <a:rPr lang="en-US" smtClean="0"/>
               <a:pPr/>
-              <a:t>7/29/16</a:t>
+              <a:t>3/7/17</a:t>
             </a:fld>
             <a:endParaRPr lang="en-US"/>
           </a:p>
@@ -10084,7 +9948,7 @@
             <a:fld id="{0459C166-16D3-4A25-A2F8-C51E0E346B22}" type="datetimeFigureOut">
               <a:rPr lang="en-US" smtClean="0"/>
               <a:pPr/>
-              <a:t>7/29/16</a:t>
+              <a:t>3/7/17</a:t>
             </a:fld>
             <a:endParaRPr lang="en-US"/>
           </a:p>
@@ -10301,7 +10165,7 @@
                 <a:latin typeface="Segoe UI"/>
               </a:rPr>
               <a:pPr/>
-              <a:t>7/29/16</a:t>
+              <a:t>3/7/17</a:t>
             </a:fld>
             <a:endParaRPr lang="en-US">
               <a:solidFill>
@@ -10506,7 +10370,7 @@
                 <a:latin typeface="Segoe UI"/>
               </a:rPr>
               <a:pPr/>
-              <a:t>7/29/16</a:t>
+              <a:t>3/7/17</a:t>
             </a:fld>
             <a:endParaRPr lang="en-US">
               <a:solidFill>
@@ -10806,7 +10670,7 @@
                 <a:latin typeface="Segoe UI"/>
               </a:rPr>
               <a:pPr/>
-              <a:t>7/29/16</a:t>
+              <a:t>3/7/17</a:t>
             </a:fld>
             <a:endParaRPr lang="en-US">
               <a:solidFill>
@@ -11080,7 +10944,7 @@
                 <a:latin typeface="Segoe UI"/>
               </a:rPr>
               <a:pPr/>
-              <a:t>7/29/16</a:t>
+              <a:t>3/7/17</a:t>
             </a:fld>
             <a:endParaRPr lang="en-US">
               <a:solidFill>
@@ -11481,7 +11345,7 @@
                 <a:latin typeface="Segoe UI"/>
               </a:rPr>
               <a:pPr/>
-              <a:t>7/29/16</a:t>
+              <a:t>3/7/17</a:t>
             </a:fld>
             <a:endParaRPr lang="en-US">
               <a:solidFill>
@@ -11635,7 +11499,7 @@
                 <a:latin typeface="Segoe UI"/>
               </a:rPr>
               <a:pPr/>
-              <a:t>7/29/16</a:t>
+              <a:t>3/7/17</a:t>
             </a:fld>
             <a:endParaRPr lang="en-US">
               <a:solidFill>
@@ -11767,7 +11631,7 @@
                 <a:latin typeface="Segoe UI"/>
               </a:rPr>
               <a:pPr/>
-              <a:t>7/29/16</a:t>
+              <a:t>3/7/17</a:t>
             </a:fld>
             <a:endParaRPr lang="en-US">
               <a:solidFill>
@@ -12079,7 +11943,7 @@
                 <a:latin typeface="Segoe UI"/>
               </a:rPr>
               <a:pPr/>
-              <a:t>7/29/16</a:t>
+              <a:t>3/7/17</a:t>
             </a:fld>
             <a:endParaRPr lang="en-US">
               <a:solidFill>
@@ -12279,7 +12143,7 @@
             <a:fld id="{0459C166-16D3-4A25-A2F8-C51E0E346B22}" type="datetimeFigureOut">
               <a:rPr lang="en-US" smtClean="0"/>
               <a:pPr/>
-              <a:t>7/29/16</a:t>
+              <a:t>3/7/17</a:t>
             </a:fld>
             <a:endParaRPr lang="en-US"/>
           </a:p>
@@ -12540,7 +12404,7 @@
                 <a:latin typeface="Segoe UI"/>
               </a:rPr>
               <a:pPr/>
-              <a:t>7/29/16</a:t>
+              <a:t>3/7/17</a:t>
             </a:fld>
             <a:endParaRPr lang="en-US">
               <a:solidFill>
@@ -12745,7 +12609,7 @@
                 <a:latin typeface="Segoe UI"/>
               </a:rPr>
               <a:pPr/>
-              <a:t>7/29/16</a:t>
+              <a:t>3/7/17</a:t>
             </a:fld>
             <a:endParaRPr lang="en-US">
               <a:solidFill>
@@ -12960,7 +12824,7 @@
                 <a:latin typeface="Segoe UI"/>
               </a:rPr>
               <a:pPr/>
-              <a:t>7/29/16</a:t>
+              <a:t>3/7/17</a:t>
             </a:fld>
             <a:endParaRPr lang="en-US">
               <a:solidFill>
@@ -13205,7 +13069,7 @@
                 <a:latin typeface="Segoe UI"/>
               </a:rPr>
               <a:pPr/>
-              <a:t>7/29/16</a:t>
+              <a:t>3/7/17</a:t>
             </a:fld>
             <a:endParaRPr lang="en-US">
               <a:solidFill>
@@ -13410,7 +13274,7 @@
                 <a:latin typeface="Segoe UI"/>
               </a:rPr>
               <a:pPr/>
-              <a:t>7/29/16</a:t>
+              <a:t>3/7/17</a:t>
             </a:fld>
             <a:endParaRPr lang="en-US">
               <a:solidFill>
@@ -13710,7 +13574,7 @@
                 <a:latin typeface="Segoe UI"/>
               </a:rPr>
               <a:pPr/>
-              <a:t>7/29/16</a:t>
+              <a:t>3/7/17</a:t>
             </a:fld>
             <a:endParaRPr lang="en-US">
               <a:solidFill>
@@ -13984,7 +13848,7 @@
                 <a:latin typeface="Segoe UI"/>
               </a:rPr>
               <a:pPr/>
-              <a:t>7/29/16</a:t>
+              <a:t>3/7/17</a:t>
             </a:fld>
             <a:endParaRPr lang="en-US">
               <a:solidFill>
@@ -14385,7 +14249,7 @@
                 <a:latin typeface="Segoe UI"/>
               </a:rPr>
               <a:pPr/>
-              <a:t>7/29/16</a:t>
+              <a:t>3/7/17</a:t>
             </a:fld>
             <a:endParaRPr lang="en-US">
               <a:solidFill>
@@ -14539,7 +14403,7 @@
                 <a:latin typeface="Segoe UI"/>
               </a:rPr>
               <a:pPr/>
-              <a:t>7/29/16</a:t>
+              <a:t>3/7/17</a:t>
             </a:fld>
             <a:endParaRPr lang="en-US">
               <a:solidFill>
@@ -14671,7 +14535,7 @@
                 <a:latin typeface="Segoe UI"/>
               </a:rPr>
               <a:pPr/>
-              <a:t>7/29/16</a:t>
+              <a:t>3/7/17</a:t>
             </a:fld>
             <a:endParaRPr lang="en-US">
               <a:solidFill>
@@ -14965,7 +14829,7 @@
             <a:fld id="{0459C166-16D3-4A25-A2F8-C51E0E346B22}" type="datetimeFigureOut">
               <a:rPr lang="en-US" smtClean="0"/>
               <a:pPr/>
-              <a:t>7/29/16</a:t>
+              <a:t>3/7/17</a:t>
             </a:fld>
             <a:endParaRPr lang="en-US"/>
           </a:p>
@@ -15265,7 +15129,7 @@
                 <a:latin typeface="Segoe UI"/>
               </a:rPr>
               <a:pPr/>
-              <a:t>7/29/16</a:t>
+              <a:t>3/7/17</a:t>
             </a:fld>
             <a:endParaRPr lang="en-US">
               <a:solidFill>
@@ -15554,7 +15418,7 @@
                 <a:latin typeface="Segoe UI"/>
               </a:rPr>
               <a:pPr/>
-              <a:t>7/29/16</a:t>
+              <a:t>3/7/17</a:t>
             </a:fld>
             <a:endParaRPr lang="en-US">
               <a:solidFill>
@@ -15759,7 +15623,7 @@
                 <a:latin typeface="Segoe UI"/>
               </a:rPr>
               <a:pPr/>
-              <a:t>7/29/16</a:t>
+              <a:t>3/7/17</a:t>
             </a:fld>
             <a:endParaRPr lang="en-US">
               <a:solidFill>
@@ -15974,7 +15838,7 @@
                 <a:latin typeface="Segoe UI"/>
               </a:rPr>
               <a:pPr/>
-              <a:t>7/29/16</a:t>
+              <a:t>3/7/17</a:t>
             </a:fld>
             <a:endParaRPr lang="en-US">
               <a:solidFill>
@@ -16306,7 +16170,7 @@
             <a:fld id="{0459C166-16D3-4A25-A2F8-C51E0E346B22}" type="datetimeFigureOut">
               <a:rPr lang="en-US" smtClean="0"/>
               <a:pPr/>
-              <a:t>7/29/16</a:t>
+              <a:t>3/7/17</a:t>
             </a:fld>
             <a:endParaRPr lang="en-US"/>
           </a:p>
@@ -16705,7 +16569,7 @@
             <a:fld id="{0459C166-16D3-4A25-A2F8-C51E0E346B22}" type="datetimeFigureOut">
               <a:rPr lang="en-US" smtClean="0"/>
               <a:pPr/>
-              <a:t>7/29/16</a:t>
+              <a:t>3/7/17</a:t>
             </a:fld>
             <a:endParaRPr lang="en-US"/>
           </a:p>
@@ -17677,7 +17541,7 @@
             <a:fld id="{0459C166-16D3-4A25-A2F8-C51E0E346B22}" type="datetimeFigureOut">
               <a:rPr lang="en-US" smtClean="0"/>
               <a:pPr/>
-              <a:t>7/29/16</a:t>
+              <a:t>3/7/17</a:t>
             </a:fld>
             <a:endParaRPr lang="en-US"/>
           </a:p>
@@ -17891,7 +17755,7 @@
             <a:fld id="{0459C166-16D3-4A25-A2F8-C51E0E346B22}" type="datetimeFigureOut">
               <a:rPr lang="en-US" smtClean="0"/>
               <a:pPr/>
-              <a:t>7/29/16</a:t>
+              <a:t>3/7/17</a:t>
             </a:fld>
             <a:endParaRPr lang="en-US"/>
           </a:p>
@@ -18438,7 +18302,7 @@
                 <a:latin typeface="Segoe UI"/>
               </a:rPr>
               <a:pPr/>
-              <a:t>7/29/16</a:t>
+              <a:t>3/7/17</a:t>
             </a:fld>
             <a:endParaRPr lang="en-US">
               <a:solidFill>
@@ -19013,7 +18877,7 @@
                 <a:latin typeface="Segoe UI"/>
               </a:rPr>
               <a:pPr/>
-              <a:t>7/29/16</a:t>
+              <a:t>3/7/17</a:t>
             </a:fld>
             <a:endParaRPr lang="en-US">
               <a:solidFill>
@@ -19982,7 +19846,7 @@
   <p:timing>
     <p:tnLst>
       <p:par>
-        <p:cTn xmlns:p14="http://schemas.microsoft.com/office/powerpoint/2010/main" id="1" dur="indefinite" restart="never" nodeType="tmRoot"/>
+        <p:cTn id="1" dur="indefinite" restart="never" nodeType="tmRoot"/>
       </p:par>
     </p:tnLst>
   </p:timing>
@@ -20403,7 +20267,7 @@
   <p:timing>
     <p:tnLst>
       <p:par>
-        <p:cTn xmlns:p14="http://schemas.microsoft.com/office/powerpoint/2010/main" id="1" dur="indefinite" restart="never" nodeType="tmRoot"/>
+        <p:cTn id="1" dur="indefinite" restart="never" nodeType="tmRoot"/>
       </p:par>
     </p:tnLst>
   </p:timing>
@@ -20909,7 +20773,7 @@
   <p:timing>
     <p:tnLst>
       <p:par>
-        <p:cTn xmlns:p14="http://schemas.microsoft.com/office/powerpoint/2010/main" id="1" dur="indefinite" restart="never" nodeType="tmRoot"/>
+        <p:cTn id="1" dur="indefinite" restart="never" nodeType="tmRoot"/>
       </p:par>
     </p:tnLst>
   </p:timing>
@@ -21410,7 +21274,7 @@
   <p:timing>
     <p:tnLst>
       <p:par>
-        <p:cTn xmlns:p14="http://schemas.microsoft.com/office/powerpoint/2010/main" id="1" dur="indefinite" restart="never" nodeType="tmRoot"/>
+        <p:cTn id="1" dur="indefinite" restart="never" nodeType="tmRoot"/>
       </p:par>
     </p:tnLst>
   </p:timing>
@@ -21854,7 +21718,7 @@
   <p:timing>
     <p:tnLst>
       <p:par>
-        <p:cTn xmlns:p14="http://schemas.microsoft.com/office/powerpoint/2010/main" id="1" dur="indefinite" restart="never" nodeType="tmRoot"/>
+        <p:cTn id="1" dur="indefinite" restart="never" nodeType="tmRoot"/>
       </p:par>
     </p:tnLst>
   </p:timing>
@@ -22527,7 +22391,7 @@
   <p:timing>
     <p:tnLst>
       <p:par>
-        <p:cTn xmlns:p14="http://schemas.microsoft.com/office/powerpoint/2010/main" id="1" dur="indefinite" restart="never" nodeType="tmRoot"/>
+        <p:cTn id="1" dur="indefinite" restart="never" nodeType="tmRoot"/>
       </p:par>
     </p:tnLst>
   </p:timing>
@@ -23003,7 +22867,7 @@
   <p:timing>
     <p:tnLst>
       <p:par>
-        <p:cTn xmlns:p14="http://schemas.microsoft.com/office/powerpoint/2010/main" id="1" dur="indefinite" restart="never" nodeType="tmRoot"/>
+        <p:cTn id="1" dur="indefinite" restart="never" nodeType="tmRoot"/>
       </p:par>
     </p:tnLst>
   </p:timing>
@@ -23435,7 +23299,7 @@
   <p:timing>
     <p:tnLst>
       <p:par>
-        <p:cTn xmlns:p14="http://schemas.microsoft.com/office/powerpoint/2010/main" id="1" dur="indefinite" restart="never" nodeType="tmRoot"/>
+        <p:cTn id="1" dur="indefinite" restart="never" nodeType="tmRoot"/>
       </p:par>
     </p:tnLst>
   </p:timing>
@@ -23928,7 +23792,7 @@
   <p:timing>
     <p:tnLst>
       <p:par>
-        <p:cTn xmlns:p14="http://schemas.microsoft.com/office/powerpoint/2010/main" id="1" dur="indefinite" restart="never" nodeType="tmRoot"/>
+        <p:cTn id="1" dur="indefinite" restart="never" nodeType="tmRoot"/>
       </p:par>
     </p:tnLst>
   </p:timing>
@@ -25980,7 +25844,7 @@
   <p:timing>
     <p:tnLst>
       <p:par>
-        <p:cTn xmlns:p14="http://schemas.microsoft.com/office/powerpoint/2010/main" id="1" dur="indefinite" restart="never" nodeType="tmRoot"/>
+        <p:cTn id="1" dur="indefinite" restart="never" nodeType="tmRoot"/>
       </p:par>
     </p:tnLst>
   </p:timing>
@@ -26422,7 +26286,7 @@
   <p:timing>
     <p:tnLst>
       <p:par>
-        <p:cTn xmlns:p14="http://schemas.microsoft.com/office/powerpoint/2010/main" id="1" dur="indefinite" restart="never" nodeType="tmRoot"/>
+        <p:cTn id="1" dur="indefinite" restart="never" nodeType="tmRoot"/>
       </p:par>
     </p:tnLst>
   </p:timing>
@@ -26878,7 +26742,7 @@
   <p:timing>
     <p:tnLst>
       <p:par>
-        <p:cTn xmlns:p14="http://schemas.microsoft.com/office/powerpoint/2010/main" id="1" dur="indefinite" restart="never" nodeType="tmRoot"/>
+        <p:cTn id="1" dur="indefinite" restart="never" nodeType="tmRoot"/>
       </p:par>
     </p:tnLst>
   </p:timing>
@@ -27338,7 +27202,7 @@
   <p:timing>
     <p:tnLst>
       <p:par>
-        <p:cTn xmlns:p14="http://schemas.microsoft.com/office/powerpoint/2010/main" id="1" dur="indefinite" restart="never" nodeType="tmRoot"/>
+        <p:cTn id="1" dur="indefinite" restart="never" nodeType="tmRoot"/>
       </p:par>
     </p:tnLst>
   </p:timing>
@@ -27530,7 +27394,7 @@
   <p:timing>
     <p:tnLst>
       <p:par>
-        <p:cTn xmlns:p14="http://schemas.microsoft.com/office/powerpoint/2010/main" id="1" dur="indefinite" restart="never" nodeType="tmRoot"/>
+        <p:cTn id="1" dur="indefinite" restart="never" nodeType="tmRoot"/>
       </p:par>
     </p:tnLst>
   </p:timing>
@@ -28192,7 +28056,7 @@
   <p:timing>
     <p:tnLst>
       <p:par>
-        <p:cTn xmlns:p14="http://schemas.microsoft.com/office/powerpoint/2010/main" id="1" dur="indefinite" restart="never" nodeType="tmRoot"/>
+        <p:cTn id="1" dur="indefinite" restart="never" nodeType="tmRoot"/>
       </p:par>
     </p:tnLst>
   </p:timing>
@@ -28668,7 +28532,7 @@
   <p:timing>
     <p:tnLst>
       <p:par>
-        <p:cTn xmlns:p14="http://schemas.microsoft.com/office/powerpoint/2010/main" id="1" dur="indefinite" restart="never" nodeType="tmRoot"/>
+        <p:cTn id="1" dur="indefinite" restart="never" nodeType="tmRoot"/>
       </p:par>
     </p:tnLst>
   </p:timing>
@@ -28928,7 +28792,7 @@
   <p:timing>
     <p:tnLst>
       <p:par>
-        <p:cTn xmlns:p14="http://schemas.microsoft.com/office/powerpoint/2010/main" id="1" dur="indefinite" restart="never" nodeType="tmRoot"/>
+        <p:cTn id="1" dur="indefinite" restart="never" nodeType="tmRoot"/>
       </p:par>
     </p:tnLst>
   </p:timing>
@@ -29358,7 +29222,7 @@
   <p:timing>
     <p:tnLst>
       <p:par>
-        <p:cTn xmlns:p14="http://schemas.microsoft.com/office/powerpoint/2010/main" id="1" dur="indefinite" restart="never" nodeType="tmRoot"/>
+        <p:cTn id="1" dur="indefinite" restart="never" nodeType="tmRoot"/>
       </p:par>
     </p:tnLst>
   </p:timing>
@@ -29600,7 +29464,7 @@
   <p:timing>
     <p:tnLst>
       <p:par>
-        <p:cTn xmlns:p14="http://schemas.microsoft.com/office/powerpoint/2010/main" id="1" dur="indefinite" restart="never" nodeType="tmRoot"/>
+        <p:cTn id="1" dur="indefinite" restart="never" nodeType="tmRoot"/>
       </p:par>
     </p:tnLst>
   </p:timing>
@@ -30047,7 +29911,7 @@
   <p:timing>
     <p:tnLst>
       <p:par>
-        <p:cTn xmlns:p14="http://schemas.microsoft.com/office/powerpoint/2010/main" id="1" dur="indefinite" restart="never" nodeType="tmRoot"/>
+        <p:cTn id="1" dur="indefinite" restart="never" nodeType="tmRoot"/>
       </p:par>
     </p:tnLst>
   </p:timing>
@@ -30479,6 +30343,19 @@
               </a:rPr>
               <a:t>The Node Object that was </a:t>
             </a:r>
+            <a:r>
+              <a:rPr lang="en-US" sz="2400" dirty="0" smtClean="0">
+                <a:solidFill>
+                  <a:schemeClr val="tx1"/>
+                </a:solidFill>
+              </a:rPr>
+              <a:t>saved the the Chef server at the end of the last Chef-client run</a:t>
+            </a:r>
+            <a:endParaRPr lang="en-US" sz="2400" dirty="0" smtClean="0">
+              <a:solidFill>
+                <a:schemeClr val="tx1"/>
+              </a:solidFill>
+            </a:endParaRPr>
           </a:p>
           <a:p>
             <a:pPr marL="1493838" lvl="3" indent="-342900">
@@ -30491,7 +30368,23 @@
                   <a:schemeClr val="tx1"/>
                 </a:solidFill>
               </a:rPr>
-              <a:t>Are stored and indexed by a Chef Server</a:t>
+              <a:t>Updated Node </a:t>
+            </a:r>
+            <a:r>
+              <a:rPr lang="en-US" sz="2400" smtClean="0">
+                <a:solidFill>
+                  <a:schemeClr val="tx1"/>
+                </a:solidFill>
+              </a:rPr>
+              <a:t>objects pushed, stored, </a:t>
+            </a:r>
+            <a:r>
+              <a:rPr lang="en-US" sz="2400" dirty="0" smtClean="0">
+                <a:solidFill>
+                  <a:schemeClr val="tx1"/>
+                </a:solidFill>
+              </a:rPr>
+              <a:t>and indexed by a Chef Server</a:t>
             </a:r>
           </a:p>
           <a:p>
@@ -30523,7 +30416,7 @@
   <p:timing>
     <p:tnLst>
       <p:par>
-        <p:cTn xmlns:p14="http://schemas.microsoft.com/office/powerpoint/2010/main" id="1" dur="indefinite" restart="never" nodeType="tmRoot"/>
+        <p:cTn id="1" dur="indefinite" restart="never" nodeType="tmRoot"/>
       </p:par>
     </p:tnLst>
   </p:timing>
@@ -30648,7 +30541,7 @@
   <p:timing>
     <p:tnLst>
       <p:par>
-        <p:cTn xmlns:p14="http://schemas.microsoft.com/office/powerpoint/2010/main" id="1" dur="indefinite" restart="never" nodeType="tmRoot"/>
+        <p:cTn id="1" dur="indefinite" restart="never" nodeType="tmRoot"/>
       </p:par>
     </p:tnLst>
   </p:timing>
@@ -31405,7 +31298,7 @@
   <p:timing>
     <p:tnLst>
       <p:par>
-        <p:cTn xmlns:p14="http://schemas.microsoft.com/office/powerpoint/2010/main" id="1" dur="indefinite" restart="never" nodeType="tmRoot"/>
+        <p:cTn id="1" dur="indefinite" restart="never" nodeType="tmRoot"/>
       </p:par>
     </p:tnLst>
   </p:timing>
@@ -31863,7 +31756,7 @@
   <p:timing>
     <p:tnLst>
       <p:par>
-        <p:cTn xmlns:p14="http://schemas.microsoft.com/office/powerpoint/2010/main" id="1" dur="indefinite" restart="never" nodeType="tmRoot"/>
+        <p:cTn id="1" dur="indefinite" restart="never" nodeType="tmRoot"/>
       </p:par>
     </p:tnLst>
   </p:timing>
@@ -33112,7 +33005,7 @@
   <p:timing>
     <p:tnLst>
       <p:par>
-        <p:cTn xmlns:p14="http://schemas.microsoft.com/office/powerpoint/2010/main" id="1" dur="indefinite" restart="never" nodeType="tmRoot"/>
+        <p:cTn id="1" dur="indefinite" restart="never" nodeType="tmRoot"/>
       </p:par>
     </p:tnLst>
   </p:timing>
@@ -33578,7 +33471,7 @@
   <p:timing>
     <p:tnLst>
       <p:par>
-        <p:cTn xmlns:p14="http://schemas.microsoft.com/office/powerpoint/2010/main" id="1" dur="indefinite" restart="never" nodeType="tmRoot"/>
+        <p:cTn id="1" dur="indefinite" restart="never" nodeType="tmRoot"/>
       </p:par>
     </p:tnLst>
   </p:timing>
@@ -34137,7 +34030,7 @@
   <p:timing>
     <p:tnLst>
       <p:par>
-        <p:cTn xmlns:p14="http://schemas.microsoft.com/office/powerpoint/2010/main" id="1" dur="indefinite" restart="never" nodeType="tmRoot"/>
+        <p:cTn id="1" dur="indefinite" restart="never" nodeType="tmRoot"/>
       </p:par>
     </p:tnLst>
   </p:timing>
@@ -34597,7 +34490,7 @@
   <p:timing>
     <p:tnLst>
       <p:par>
-        <p:cTn xmlns:p14="http://schemas.microsoft.com/office/powerpoint/2010/main" id="1" dur="indefinite" restart="never" nodeType="tmRoot"/>
+        <p:cTn id="1" dur="indefinite" restart="never" nodeType="tmRoot"/>
       </p:par>
     </p:tnLst>
   </p:timing>
@@ -35047,7 +34940,7 @@
   <p:timing>
     <p:tnLst>
       <p:par>
-        <p:cTn xmlns:p14="http://schemas.microsoft.com/office/powerpoint/2010/main" id="1" dur="indefinite" restart="never" nodeType="tmRoot"/>
+        <p:cTn id="1" dur="indefinite" restart="never" nodeType="tmRoot"/>
       </p:par>
     </p:tnLst>
   </p:timing>
@@ -35108,7 +35001,7 @@
         <p:spPr/>
         <p:txBody>
           <a:bodyPr>
-            <a:normAutofit fontScale="85000" lnSpcReduction="10000"/>
+            <a:normAutofit fontScale="92500" lnSpcReduction="20000"/>
           </a:bodyPr>
           <a:lstStyle/>
           <a:p>
@@ -35170,7 +35063,7 @@
   <p:timing>
     <p:tnLst>
       <p:par>
-        <p:cTn xmlns:p14="http://schemas.microsoft.com/office/powerpoint/2010/main" id="1" dur="indefinite" restart="never" nodeType="tmRoot"/>
+        <p:cTn id="1" dur="indefinite" restart="never" nodeType="tmRoot"/>
       </p:par>
     </p:tnLst>
   </p:timing>
@@ -35239,7 +35132,7 @@
         <p:spPr/>
         <p:txBody>
           <a:bodyPr>
-            <a:normAutofit fontScale="92500" lnSpcReduction="10000"/>
+            <a:normAutofit lnSpcReduction="10000"/>
           </a:bodyPr>
           <a:lstStyle/>
           <a:p>
@@ -36006,7 +35899,7 @@
   <p:timing>
     <p:tnLst>
       <p:par>
-        <p:cTn xmlns:p14="http://schemas.microsoft.com/office/powerpoint/2010/main" id="1" dur="indefinite" restart="never" nodeType="tmRoot"/>
+        <p:cTn id="1" dur="indefinite" restart="never" nodeType="tmRoot"/>
       </p:par>
     </p:tnLst>
   </p:timing>
@@ -36696,7 +36589,7 @@
   <p:timing>
     <p:tnLst>
       <p:par>
-        <p:cTn xmlns:p14="http://schemas.microsoft.com/office/powerpoint/2010/main" id="1" dur="indefinite" restart="never" nodeType="tmRoot"/>
+        <p:cTn id="1" dur="indefinite" restart="never" nodeType="tmRoot"/>
       </p:par>
     </p:tnLst>
   </p:timing>
@@ -40606,7 +40499,7 @@
   <a:extraClrSchemeLst/>
   <a:extLst>
     <a:ext uri="{05A4C25C-085E-4340-85A3-A5531E510DB2}">
-      <thm15:themeFamily xmlns:thm15="http://schemas.microsoft.com/office/thememl/2012/main" xmlns="" name="Office Theme" id="{62F939B6-93AF-4DB8-9C6B-D6C7DFDC589F}" vid="{4A3C46E8-61CC-4603-A589-7422A47A8E4A}"/>
+      <thm15:themeFamily xmlns:thm15="http://schemas.microsoft.com/office/thememl/2012/main" name="Office Theme" id="{62F939B6-93AF-4DB8-9C6B-D6C7DFDC589F}" vid="{4A3C46E8-61CC-4603-A589-7422A47A8E4A}"/>
     </a:ext>
   </a:extLst>
 </a:theme>
@@ -40807,7 +40700,7 @@
   <a:extraClrSchemeLst/>
   <a:extLst>
     <a:ext uri="{05A4C25C-085E-4340-85A3-A5531E510DB2}">
-      <thm15:themeFamily xmlns="" xmlns:thm15="http://schemas.microsoft.com/office/thememl/2012/main" name="Office Theme" id="{62F939B6-93AF-4DB8-9C6B-D6C7DFDC589F}" vid="{4A3C46E8-61CC-4603-A589-7422A47A8E4A}"/>
+      <thm15:themeFamily xmlns:thm15="http://schemas.microsoft.com/office/thememl/2012/main" name="Office Theme" id="{62F939B6-93AF-4DB8-9C6B-D6C7DFDC589F}" vid="{4A3C46E8-61CC-4603-A589-7422A47A8E4A}"/>
     </a:ext>
   </a:extLst>
 </a:theme>
@@ -41034,7 +40927,7 @@
   <a:extraClrSchemeLst/>
   <a:extLst>
     <a:ext uri="{05A4C25C-085E-4340-85A3-A5531E510DB2}">
-      <thm15:themeFamily xmlns="" xmlns:thm15="http://schemas.microsoft.com/office/thememl/2012/main" name="Office Theme" id="{62F939B6-93AF-4DB8-9C6B-D6C7DFDC589F}" vid="{4A3C46E8-61CC-4603-A589-7422A47A8E4A}"/>
+      <thm15:themeFamily xmlns:thm15="http://schemas.microsoft.com/office/thememl/2012/main" name="Office Theme" id="{62F939B6-93AF-4DB8-9C6B-D6C7DFDC589F}" vid="{4A3C46E8-61CC-4603-A589-7422A47A8E4A}"/>
     </a:ext>
   </a:extLst>
 </a:theme>
@@ -41329,7 +41222,7 @@
   <a:extraClrSchemeLst/>
   <a:extLst>
     <a:ext uri="{05A4C25C-085E-4340-85A3-A5531E510DB2}">
-      <thm15:themeFamily xmlns="" xmlns:thm15="http://schemas.microsoft.com/office/thememl/2012/main" name="Office Theme" id="{62F939B6-93AF-4DB8-9C6B-D6C7DFDC589F}" vid="{4A3C46E8-61CC-4603-A589-7422A47A8E4A}"/>
+      <thm15:themeFamily xmlns:thm15="http://schemas.microsoft.com/office/thememl/2012/main" name="Office Theme" id="{62F939B6-93AF-4DB8-9C6B-D6C7DFDC589F}" vid="{4A3C46E8-61CC-4603-A589-7422A47A8E4A}"/>
     </a:ext>
   </a:extLst>
 </a:theme>

</xml_diff>